<commit_message>
title slide done, readme edited
</commit_message>
<xml_diff>
--- a/Grooveshark.pptx
+++ b/Grooveshark.pptx
@@ -3331,9 +3331,33 @@
           </a:p>
         </p:txBody>
       </p:sp>
-      <p:sp>
-        <p:nvSpPr>
-          <p:cNvPr id="7" name="Rectangle 6"/>
+      <p:pic>
+        <p:nvPicPr>
+          <p:cNvPr id="7" name="Picture 6" descr="Search.png"/>
+          <p:cNvPicPr>
+            <a:picLocks noChangeAspect="1"/>
+          </p:cNvPicPr>
+          <p:nvPr/>
+        </p:nvPicPr>
+        <p:blipFill>
+          <a:blip r:embed="rId2"/>
+          <a:stretch>
+            <a:fillRect/>
+          </a:stretch>
+        </p:blipFill>
+        <p:spPr>
+          <a:xfrm>
+            <a:off x="0" y="0"/>
+            <a:ext cx="9144000" cy="687586"/>
+          </a:xfrm>
+          <a:prstGeom prst="rect">
+            <a:avLst/>
+          </a:prstGeom>
+        </p:spPr>
+      </p:pic>
+      <p:sp>
+        <p:nvSpPr>
+          <p:cNvPr id="8" name="Rectangle 7"/>
           <p:cNvSpPr/>
           <p:nvPr/>
         </p:nvSpPr>
@@ -3378,63 +3402,28 @@
       </p:sp>
       <p:pic>
         <p:nvPicPr>
-          <p:cNvPr id="8" name="Picture 7" descr="groovesharklogo.png"/>
+          <p:cNvPr id="9" name="Picture 8" descr="gs2.png"/>
           <p:cNvPicPr>
             <a:picLocks noChangeAspect="1"/>
           </p:cNvPicPr>
           <p:nvPr/>
         </p:nvPicPr>
         <p:blipFill>
-          <a:blip r:embed="rId2"/>
+          <a:blip r:embed="rId3"/>
           <a:stretch>
             <a:fillRect/>
           </a:stretch>
         </p:blipFill>
         <p:spPr>
           <a:xfrm>
-            <a:off x="3657600" y="457200"/>
-            <a:ext cx="1828800" cy="1828800"/>
+            <a:off x="1371600" y="182880"/>
+            <a:ext cx="6400800" cy="3334549"/>
           </a:xfrm>
           <a:prstGeom prst="rect">
             <a:avLst/>
           </a:prstGeom>
         </p:spPr>
       </p:pic>
-      <p:sp>
-        <p:nvSpPr>
-          <p:cNvPr id="9" name="TextBox 8"/>
-          <p:cNvSpPr txBox="1"/>
-          <p:nvPr/>
-        </p:nvSpPr>
-        <p:spPr>
-          <a:xfrm>
-            <a:off x="3383280" y="2286000"/>
-            <a:ext cx="7315200" cy="1371600"/>
-          </a:xfrm>
-          <a:prstGeom prst="rect">
-            <a:avLst/>
-          </a:prstGeom>
-          <a:noFill/>
-        </p:spPr>
-        <p:txBody>
-          <a:bodyPr wrap="none">
-            <a:spAutoFit/>
-          </a:bodyPr>
-          <a:lstStyle/>
-          <a:p>
-            <a:pPr>
-              <a:defRPr sz="2500">
-                <a:solidFill>
-                  <a:srgbClr val="FFFFFF"/>
-                </a:solidFill>
-              </a:defRPr>
-            </a:pPr>
-            <a:r>
-              <a:t>Search for music</a:t>
-            </a:r>
-          </a:p>
-        </p:txBody>
-      </p:sp>
       <p:sp>
         <p:nvSpPr>
           <p:cNvPr id="10" name="Rounded Rectangle 9"/>
@@ -3443,7 +3432,7 @@
         </p:nvSpPr>
         <p:spPr>
           <a:xfrm>
-            <a:off x="1828800" y="3200400"/>
+            <a:off x="1828800" y="2286000"/>
             <a:ext cx="5486400" cy="457200"/>
           </a:xfrm>
           <a:prstGeom prst="roundRect">
@@ -3488,7 +3477,7 @@
         </p:nvSpPr>
         <p:spPr>
           <a:xfrm>
-            <a:off x="1828800" y="3200400"/>
+            <a:off x="1828800" y="2286000"/>
             <a:ext cx="5486400" cy="457200"/>
           </a:xfrm>
           <a:prstGeom prst="rect">
@@ -3502,8 +3491,9 @@
           </a:bodyPr>
           <a:lstStyle/>
           <a:p>
-            <a:r>
-              <a:rPr sz="2000">
+            <a:pPr algn="ctr"/>
+            <a:r>
+              <a:rPr sz="2200">
                 <a:solidFill>
                   <a:srgbClr val="000000"/>
                 </a:solidFill>

</xml_diff>